<commit_message>
Added project link to presentation
</commit_message>
<xml_diff>
--- a/Presentation/Vortrag - Simulating the GPU-based shaders in the graphics pipeline on a CPU-based language to allow code inspection at runtime.pptx
+++ b/Presentation/Vortrag - Simulating the GPU-based shaders in the graphics pipeline on a CPU-based language to allow code inspection at runtime.pptx
@@ -5,10 +5,10 @@
     <p:sldMasterId id="2147483648" r:id="rId1"/>
   </p:sldMasterIdLst>
   <p:notesMasterIdLst>
-    <p:notesMasterId r:id="rId17"/>
+    <p:notesMasterId r:id="rId18"/>
   </p:notesMasterIdLst>
   <p:handoutMasterIdLst>
-    <p:handoutMasterId r:id="rId18"/>
+    <p:handoutMasterId r:id="rId19"/>
   </p:handoutMasterIdLst>
   <p:sldIdLst>
     <p:sldId id="256" r:id="rId2"/>
@@ -26,6 +26,7 @@
     <p:sldId id="294" r:id="rId14"/>
     <p:sldId id="280" r:id="rId15"/>
     <p:sldId id="281" r:id="rId16"/>
+    <p:sldId id="295" r:id="rId17"/>
   </p:sldIdLst>
   <p:sldSz cx="9144000" cy="6858000" type="screen4x3"/>
   <p:notesSz cx="6858000" cy="9144000"/>
@@ -209,7 +210,7 @@
           <a:p>
             <a:fld id="{632E49BE-D5A6-4121-A26B-F12657AC0195}" type="datetimeFigureOut">
               <a:rPr lang="de-DE" smtClean="0"/>
-              <a:t>24.09.2019</a:t>
+              <a:t>25.09.2019</a:t>
             </a:fld>
             <a:endParaRPr lang="de-DE"/>
           </a:p>
@@ -375,7 +376,7 @@
           <a:p>
             <a:fld id="{4BB935F9-976D-4DE2-ABB0-B8F170B79E2D}" type="datetimeFigureOut">
               <a:rPr lang="de-DE" smtClean="0"/>
-              <a:t>24.09.2019</a:t>
+              <a:t>25.09.2019</a:t>
             </a:fld>
             <a:endParaRPr lang="de-DE"/>
           </a:p>
@@ -8651,8 +8652,16 @@
               <a:buAutoNum type="arabicPeriod"/>
             </a:pPr>
             <a:r>
-              <a:rPr lang="de-DE" dirty="0"/>
-              <a:t>https://www.nvidia.de/docs/IO/124748/header-nsight-logo.jpg</a:t>
+              <a:rPr lang="de-DE" dirty="0">
+                <a:hlinkClick r:id="rId5"/>
+              </a:rPr>
+              <a:t>https://</a:t>
+            </a:r>
+            <a:r>
+              <a:rPr lang="de-DE" dirty="0" smtClean="0">
+                <a:hlinkClick r:id="rId5"/>
+              </a:rPr>
+              <a:t>www.nvidia.de/docs/IO/124748/header-nsight-logo.jpg</a:t>
             </a:r>
             <a:endParaRPr lang="de-DE" dirty="0" smtClean="0"/>
           </a:p>
@@ -8684,6 +8693,13 @@
             </a:pPr>
             <a:endParaRPr lang="de-DE" dirty="0" smtClean="0"/>
           </a:p>
+          <a:p>
+            <a:pPr marL="514350" indent="-514350">
+              <a:buFont typeface="+mj-lt"/>
+              <a:buAutoNum type="arabicPeriod"/>
+            </a:pPr>
+            <a:endParaRPr lang="de-DE" dirty="0" smtClean="0"/>
+          </a:p>
         </p:txBody>
       </p:sp>
       <p:sp>
@@ -8758,6 +8774,243 @@
     <p:extLst>
       <p:ext uri="{BB962C8B-B14F-4D97-AF65-F5344CB8AC3E}">
         <p14:creationId xmlns:p14="http://schemas.microsoft.com/office/powerpoint/2010/main" val="1419995839"/>
+      </p:ext>
+    </p:extLst>
+  </p:cSld>
+  <p:clrMapOvr>
+    <a:masterClrMapping/>
+  </p:clrMapOvr>
+  <p:timing>
+    <p:tnLst>
+      <p:par>
+        <p:cTn id="1" dur="indefinite" restart="never" nodeType="tmRoot"/>
+      </p:par>
+    </p:tnLst>
+  </p:timing>
+</p:sld>
+</file>
+
+<file path=ppt/slides/slide16.xml><?xml version="1.0" encoding="utf-8"?>
+<p:sld xmlns:a="http://schemas.openxmlformats.org/drawingml/2006/main" xmlns:r="http://schemas.openxmlformats.org/officeDocument/2006/relationships" xmlns:p="http://schemas.openxmlformats.org/presentationml/2006/main">
+  <p:cSld>
+    <p:spTree>
+      <p:nvGrpSpPr>
+        <p:cNvPr id="1" name=""/>
+        <p:cNvGrpSpPr/>
+        <p:nvPr/>
+      </p:nvGrpSpPr>
+      <p:grpSpPr>
+        <a:xfrm>
+          <a:off x="0" y="0"/>
+          <a:ext cx="0" cy="0"/>
+          <a:chOff x="0" y="0"/>
+          <a:chExt cx="0" cy="0"/>
+        </a:xfrm>
+      </p:grpSpPr>
+      <p:sp>
+        <p:nvSpPr>
+          <p:cNvPr id="2" name="Titel 1"/>
+          <p:cNvSpPr>
+            <a:spLocks noGrp="1"/>
+          </p:cNvSpPr>
+          <p:nvPr>
+            <p:ph type="title"/>
+          </p:nvPr>
+        </p:nvSpPr>
+        <p:spPr/>
+        <p:txBody>
+          <a:bodyPr/>
+          <a:lstStyle/>
+          <a:p>
+            <a:r>
+              <a:rPr lang="de-DE" dirty="0" smtClean="0"/>
+              <a:t>Projekt</a:t>
+            </a:r>
+            <a:endParaRPr lang="de-DE" dirty="0"/>
+          </a:p>
+        </p:txBody>
+      </p:sp>
+      <p:sp>
+        <p:nvSpPr>
+          <p:cNvPr id="3" name="Inhaltsplatzhalter 2"/>
+          <p:cNvSpPr>
+            <a:spLocks noGrp="1"/>
+          </p:cNvSpPr>
+          <p:nvPr>
+            <p:ph idx="1"/>
+          </p:nvPr>
+        </p:nvSpPr>
+        <p:spPr>
+          <a:xfrm>
+            <a:off x="467544" y="2564904"/>
+            <a:ext cx="8229600" cy="648072"/>
+          </a:xfrm>
+        </p:spPr>
+        <p:txBody>
+          <a:bodyPr>
+            <a:normAutofit/>
+          </a:bodyPr>
+          <a:lstStyle/>
+          <a:p>
+            <a:pPr marL="0" indent="0">
+              <a:buNone/>
+            </a:pPr>
+            <a:r>
+              <a:rPr lang="de-DE" dirty="0">
+                <a:hlinkClick r:id="rId2"/>
+              </a:rPr>
+              <a:t>https://</a:t>
+            </a:r>
+            <a:r>
+              <a:rPr lang="de-DE" dirty="0" smtClean="0">
+                <a:hlinkClick r:id="rId2"/>
+              </a:rPr>
+              <a:t>github.com/MMDaemon/ShaderSim</a:t>
+            </a:r>
+            <a:endParaRPr lang="de-DE" dirty="0" smtClean="0"/>
+          </a:p>
+          <a:p>
+            <a:pPr marL="0" indent="0">
+              <a:buNone/>
+            </a:pPr>
+            <a:endParaRPr lang="de-DE" dirty="0" smtClean="0"/>
+          </a:p>
+          <a:p>
+            <a:pPr marL="514350" indent="-514350">
+              <a:buFont typeface="+mj-lt"/>
+              <a:buAutoNum type="arabicPeriod"/>
+            </a:pPr>
+            <a:endParaRPr lang="de-DE" dirty="0" smtClean="0"/>
+          </a:p>
+          <a:p>
+            <a:pPr marL="514350" indent="-514350">
+              <a:buFont typeface="+mj-lt"/>
+              <a:buAutoNum type="arabicPeriod"/>
+            </a:pPr>
+            <a:endParaRPr lang="de-DE" dirty="0" smtClean="0"/>
+          </a:p>
+          <a:p>
+            <a:pPr marL="514350" indent="-514350">
+              <a:buFont typeface="+mj-lt"/>
+              <a:buAutoNum type="arabicPeriod"/>
+            </a:pPr>
+            <a:endParaRPr lang="de-DE" dirty="0" smtClean="0"/>
+          </a:p>
+        </p:txBody>
+      </p:sp>
+      <p:sp>
+        <p:nvSpPr>
+          <p:cNvPr id="4" name="Datumsplatzhalter 3"/>
+          <p:cNvSpPr>
+            <a:spLocks noGrp="1"/>
+          </p:cNvSpPr>
+          <p:nvPr>
+            <p:ph type="dt" sz="half" idx="10"/>
+          </p:nvPr>
+        </p:nvSpPr>
+        <p:spPr/>
+        <p:txBody>
+          <a:bodyPr/>
+          <a:lstStyle/>
+          <a:p>
+            <a:r>
+              <a:rPr lang="de-DE" dirty="0"/>
+              <a:t>25.09.2019</a:t>
+            </a:r>
+          </a:p>
+        </p:txBody>
+      </p:sp>
+      <p:sp>
+        <p:nvSpPr>
+          <p:cNvPr id="5" name="Fußzeilenplatzhalter 4"/>
+          <p:cNvSpPr>
+            <a:spLocks noGrp="1"/>
+          </p:cNvSpPr>
+          <p:nvPr>
+            <p:ph type="ftr" sz="quarter" idx="11"/>
+          </p:nvPr>
+        </p:nvSpPr>
+        <p:spPr/>
+        <p:txBody>
+          <a:bodyPr/>
+          <a:lstStyle/>
+          <a:p>
+            <a:r>
+              <a:rPr lang="de-DE" smtClean="0"/>
+              <a:t>Matthias Mettenleiter</a:t>
+            </a:r>
+            <a:endParaRPr lang="de-DE"/>
+          </a:p>
+        </p:txBody>
+      </p:sp>
+      <p:sp>
+        <p:nvSpPr>
+          <p:cNvPr id="6" name="Foliennummernplatzhalter 5"/>
+          <p:cNvSpPr>
+            <a:spLocks noGrp="1"/>
+          </p:cNvSpPr>
+          <p:nvPr>
+            <p:ph type="sldNum" sz="quarter" idx="12"/>
+          </p:nvPr>
+        </p:nvSpPr>
+        <p:spPr/>
+        <p:txBody>
+          <a:bodyPr/>
+          <a:lstStyle/>
+          <a:p>
+            <a:fld id="{B19EDA2B-D1ED-49F1-A641-C679BE89B1F0}" type="slidenum">
+              <a:rPr lang="de-DE" smtClean="0"/>
+              <a:t>16</a:t>
+            </a:fld>
+            <a:endParaRPr lang="de-DE"/>
+          </a:p>
+        </p:txBody>
+      </p:sp>
+      <p:pic>
+        <p:nvPicPr>
+          <p:cNvPr id="1026" name="Picture 2" descr="C:\Users\Anja\Downloads\frame.png"/>
+          <p:cNvPicPr>
+            <a:picLocks noChangeAspect="1" noChangeArrowheads="1"/>
+          </p:cNvPicPr>
+          <p:nvPr/>
+        </p:nvPicPr>
+        <p:blipFill>
+          <a:blip r:embed="rId3">
+            <a:extLst>
+              <a:ext uri="{28A0092B-C50C-407E-A947-70E740481C1C}">
+                <a14:useLocalDpi xmlns:a14="http://schemas.microsoft.com/office/drawing/2010/main" val="0"/>
+              </a:ext>
+            </a:extLst>
+          </a:blip>
+          <a:srcRect/>
+          <a:stretch>
+            <a:fillRect/>
+          </a:stretch>
+        </p:blipFill>
+        <p:spPr bwMode="auto">
+          <a:xfrm>
+            <a:off x="3082652" y="3212976"/>
+            <a:ext cx="2857500" cy="2857500"/>
+          </a:xfrm>
+          <a:prstGeom prst="rect">
+            <a:avLst/>
+          </a:prstGeom>
+          <a:noFill/>
+          <a:extLst>
+            <a:ext uri="{909E8E84-426E-40DD-AFC4-6F175D3DCCD1}">
+              <a14:hiddenFill xmlns:a14="http://schemas.microsoft.com/office/drawing/2010/main">
+                <a:solidFill>
+                  <a:srgbClr val="FFFFFF"/>
+                </a:solidFill>
+              </a14:hiddenFill>
+            </a:ext>
+          </a:extLst>
+        </p:spPr>
+      </p:pic>
+    </p:spTree>
+    <p:extLst>
+      <p:ext uri="{BB962C8B-B14F-4D97-AF65-F5344CB8AC3E}">
+        <p14:creationId xmlns:p14="http://schemas.microsoft.com/office/powerpoint/2010/main" val="2883372857"/>
       </p:ext>
     </p:extLst>
   </p:cSld>

</xml_diff>